<commit_message>
Revised rotate icons (the R jumps around), enhanced signal plots
</commit_message>
<xml_diff>
--- a/icons/Icons for Circuit Sansbox.pptx
+++ b/icons/Icons for Circuit Sansbox.pptx
@@ -243,7 +243,7 @@
           <a:p>
             <a:fld id="{FA314C3E-7952-8E4B-B73C-7E91A6D05A67}" type="datetimeFigureOut">
               <a:rPr lang="en-US" smtClean="0"/>
-              <a:t>6/25/16</a:t>
+              <a:t>7/7/16</a:t>
             </a:fld>
             <a:endParaRPr lang="en-US"/>
           </a:p>
@@ -413,7 +413,7 @@
           <a:p>
             <a:fld id="{FA314C3E-7952-8E4B-B73C-7E91A6D05A67}" type="datetimeFigureOut">
               <a:rPr lang="en-US" smtClean="0"/>
-              <a:t>6/25/16</a:t>
+              <a:t>7/7/16</a:t>
             </a:fld>
             <a:endParaRPr lang="en-US"/>
           </a:p>
@@ -593,7 +593,7 @@
           <a:p>
             <a:fld id="{FA314C3E-7952-8E4B-B73C-7E91A6D05A67}" type="datetimeFigureOut">
               <a:rPr lang="en-US" smtClean="0"/>
-              <a:t>6/25/16</a:t>
+              <a:t>7/7/16</a:t>
             </a:fld>
             <a:endParaRPr lang="en-US"/>
           </a:p>
@@ -763,7 +763,7 @@
           <a:p>
             <a:fld id="{FA314C3E-7952-8E4B-B73C-7E91A6D05A67}" type="datetimeFigureOut">
               <a:rPr lang="en-US" smtClean="0"/>
-              <a:t>6/25/16</a:t>
+              <a:t>7/7/16</a:t>
             </a:fld>
             <a:endParaRPr lang="en-US"/>
           </a:p>
@@ -1009,7 +1009,7 @@
           <a:p>
             <a:fld id="{FA314C3E-7952-8E4B-B73C-7E91A6D05A67}" type="datetimeFigureOut">
               <a:rPr lang="en-US" smtClean="0"/>
-              <a:t>6/25/16</a:t>
+              <a:t>7/7/16</a:t>
             </a:fld>
             <a:endParaRPr lang="en-US"/>
           </a:p>
@@ -1241,7 +1241,7 @@
           <a:p>
             <a:fld id="{FA314C3E-7952-8E4B-B73C-7E91A6D05A67}" type="datetimeFigureOut">
               <a:rPr lang="en-US" smtClean="0"/>
-              <a:t>6/25/16</a:t>
+              <a:t>7/7/16</a:t>
             </a:fld>
             <a:endParaRPr lang="en-US"/>
           </a:p>
@@ -1608,7 +1608,7 @@
           <a:p>
             <a:fld id="{FA314C3E-7952-8E4B-B73C-7E91A6D05A67}" type="datetimeFigureOut">
               <a:rPr lang="en-US" smtClean="0"/>
-              <a:t>6/25/16</a:t>
+              <a:t>7/7/16</a:t>
             </a:fld>
             <a:endParaRPr lang="en-US"/>
           </a:p>
@@ -1726,7 +1726,7 @@
           <a:p>
             <a:fld id="{FA314C3E-7952-8E4B-B73C-7E91A6D05A67}" type="datetimeFigureOut">
               <a:rPr lang="en-US" smtClean="0"/>
-              <a:t>6/25/16</a:t>
+              <a:t>7/7/16</a:t>
             </a:fld>
             <a:endParaRPr lang="en-US"/>
           </a:p>
@@ -1821,7 +1821,7 @@
           <a:p>
             <a:fld id="{FA314C3E-7952-8E4B-B73C-7E91A6D05A67}" type="datetimeFigureOut">
               <a:rPr lang="en-US" smtClean="0"/>
-              <a:t>6/25/16</a:t>
+              <a:t>7/7/16</a:t>
             </a:fld>
             <a:endParaRPr lang="en-US"/>
           </a:p>
@@ -2098,7 +2098,7 @@
           <a:p>
             <a:fld id="{FA314C3E-7952-8E4B-B73C-7E91A6D05A67}" type="datetimeFigureOut">
               <a:rPr lang="en-US" smtClean="0"/>
-              <a:t>6/25/16</a:t>
+              <a:t>7/7/16</a:t>
             </a:fld>
             <a:endParaRPr lang="en-US"/>
           </a:p>
@@ -2351,7 +2351,7 @@
           <a:p>
             <a:fld id="{FA314C3E-7952-8E4B-B73C-7E91A6D05A67}" type="datetimeFigureOut">
               <a:rPr lang="en-US" smtClean="0"/>
-              <a:t>6/25/16</a:t>
+              <a:t>7/7/16</a:t>
             </a:fld>
             <a:endParaRPr lang="en-US"/>
           </a:p>
@@ -2564,7 +2564,7 @@
           <a:p>
             <a:fld id="{FA314C3E-7952-8E4B-B73C-7E91A6D05A67}" type="datetimeFigureOut">
               <a:rPr lang="en-US" smtClean="0"/>
-              <a:t>6/25/16</a:t>
+              <a:t>7/7/16</a:t>
             </a:fld>
             <a:endParaRPr lang="en-US"/>
           </a:p>
@@ -2991,32 +2991,8 @@
         </p:blipFill>
         <p:spPr>
           <a:xfrm>
-            <a:off x="7315200" y="5181600"/>
+            <a:off x="7315200" y="5581650"/>
             <a:ext cx="5372100" cy="2552700"/>
-          </a:xfrm>
-          <a:prstGeom prst="rect">
-            <a:avLst/>
-          </a:prstGeom>
-        </p:spPr>
-      </p:pic>
-      <p:pic>
-        <p:nvPicPr>
-          <p:cNvPr id="5" name="Picture 4"/>
-          <p:cNvPicPr>
-            <a:picLocks noChangeAspect="1"/>
-          </p:cNvPicPr>
-          <p:nvPr/>
-        </p:nvPicPr>
-        <p:blipFill>
-          <a:blip r:embed="rId3"/>
-          <a:stretch>
-            <a:fillRect/>
-          </a:stretch>
-        </p:blipFill>
-        <p:spPr>
-          <a:xfrm>
-            <a:off x="6019800" y="3886200"/>
-            <a:ext cx="657514" cy="657514"/>
           </a:xfrm>
           <a:prstGeom prst="rect">
             <a:avLst/>
@@ -3407,36 +3383,6 @@
           </a:p>
         </p:txBody>
       </p:sp>
-      <p:pic>
-        <p:nvPicPr>
-          <p:cNvPr id="17" name="Picture 16"/>
-          <p:cNvPicPr>
-            <a:picLocks noChangeAspect="1"/>
-          </p:cNvPicPr>
-          <p:nvPr/>
-        </p:nvPicPr>
-        <p:blipFill>
-          <a:blip r:embed="rId3">
-            <a:extLst>
-              <a:ext uri="{28A0092B-C50C-407E-A947-70E740481C1C}">
-                <a14:useLocalDpi xmlns:a14="http://schemas.microsoft.com/office/drawing/2010/main" val="0"/>
-              </a:ext>
-            </a:extLst>
-          </a:blip>
-          <a:stretch>
-            <a:fillRect/>
-          </a:stretch>
-        </p:blipFill>
-        <p:spPr>
-          <a:xfrm>
-            <a:off x="6858000" y="2819400"/>
-            <a:ext cx="914400" cy="914400"/>
-          </a:xfrm>
-          <a:prstGeom prst="rect">
-            <a:avLst/>
-          </a:prstGeom>
-        </p:spPr>
-      </p:pic>
       <p:sp>
         <p:nvSpPr>
           <p:cNvPr id="18" name="Rounded Rectangle 17"/>
@@ -4477,13 +4423,13 @@
           <p:nvPr/>
         </p:nvSpPr>
         <p:spPr>
-          <a:xfrm>
-            <a:off x="9144000" y="3276600"/>
+          <a:xfrm rot="5400000">
+            <a:off x="8953500" y="3086100"/>
             <a:ext cx="1524000" cy="1524000"/>
           </a:xfrm>
           <a:prstGeom prst="arc">
             <a:avLst>
-              <a:gd name="adj1" fmla="val 80557"/>
+              <a:gd name="adj1" fmla="val 9412776"/>
               <a:gd name="adj2" fmla="val 16124760"/>
             </a:avLst>
           </a:prstGeom>
@@ -4523,8 +4469,8 @@
           <p:nvPr/>
         </p:nvSpPr>
         <p:spPr>
-          <a:xfrm>
-            <a:off x="9829800" y="2895600"/>
+          <a:xfrm rot="5400000">
+            <a:off x="10401300" y="3467100"/>
             <a:ext cx="152400" cy="762000"/>
           </a:xfrm>
           <a:prstGeom prst="roundRect">
@@ -4571,8 +4517,8 @@
           <p:nvPr/>
         </p:nvSpPr>
         <p:spPr>
-          <a:xfrm rot="18386567">
-            <a:off x="10056232" y="2786470"/>
+          <a:xfrm rot="2186567">
+            <a:off x="10566111" y="3749213"/>
             <a:ext cx="152400" cy="650638"/>
           </a:xfrm>
           <a:prstGeom prst="roundRect">
@@ -4619,8 +4565,8 @@
           <p:nvPr/>
         </p:nvSpPr>
         <p:spPr>
-          <a:xfrm rot="14048336">
-            <a:off x="10067661" y="3102779"/>
+          <a:xfrm rot="19448336">
+            <a:off x="10242683" y="3753523"/>
             <a:ext cx="152400" cy="664876"/>
           </a:xfrm>
           <a:prstGeom prst="roundRect">
@@ -4667,8 +4613,8 @@
           <p:nvPr/>
         </p:nvSpPr>
         <p:spPr>
-          <a:xfrm rot="5400000">
-            <a:off x="9829800" y="3048000"/>
+          <a:xfrm rot="10800000">
+            <a:off x="10172700" y="3848100"/>
             <a:ext cx="609600" cy="457200"/>
           </a:xfrm>
           <a:prstGeom prst="triangle">
@@ -4705,6 +4651,116 @@
           <a:p>
             <a:pPr algn="ctr"/>
             <a:endParaRPr lang="en-US"/>
+          </a:p>
+        </p:txBody>
+      </p:sp>
+      <p:sp>
+        <p:nvSpPr>
+          <p:cNvPr id="31" name="Rectangle 30"/>
+          <p:cNvSpPr/>
+          <p:nvPr/>
+        </p:nvSpPr>
+        <p:spPr>
+          <a:xfrm>
+            <a:off x="1752600" y="4648200"/>
+            <a:ext cx="152400" cy="457200"/>
+          </a:xfrm>
+          <a:prstGeom prst="rect">
+            <a:avLst/>
+          </a:prstGeom>
+          <a:noFill/>
+          <a:ln>
+            <a:noFill/>
+          </a:ln>
+        </p:spPr>
+        <p:style>
+          <a:lnRef idx="2">
+            <a:schemeClr val="accent1">
+              <a:shade val="50000"/>
+            </a:schemeClr>
+          </a:lnRef>
+          <a:fillRef idx="1">
+            <a:schemeClr val="accent1"/>
+          </a:fillRef>
+          <a:effectRef idx="0">
+            <a:schemeClr val="accent1"/>
+          </a:effectRef>
+          <a:fontRef idx="minor">
+            <a:schemeClr val="lt1"/>
+          </a:fontRef>
+        </p:style>
+        <p:txBody>
+          <a:bodyPr rtlCol="0" anchor="ctr"/>
+          <a:lstStyle/>
+          <a:p>
+            <a:pPr algn="ctr"/>
+            <a:endParaRPr lang="en-US"/>
+          </a:p>
+        </p:txBody>
+      </p:sp>
+      <p:sp>
+        <p:nvSpPr>
+          <p:cNvPr id="40" name="TextBox 39"/>
+          <p:cNvSpPr txBox="1"/>
+          <p:nvPr/>
+        </p:nvSpPr>
+        <p:spPr>
+          <a:xfrm>
+            <a:off x="1219200" y="5715000"/>
+            <a:ext cx="2556662" cy="369332"/>
+          </a:xfrm>
+          <a:prstGeom prst="rect">
+            <a:avLst/>
+          </a:prstGeom>
+          <a:noFill/>
+        </p:spPr>
+        <p:txBody>
+          <a:bodyPr wrap="none" rtlCol="0">
+            <a:spAutoFit/>
+          </a:bodyPr>
+          <a:lstStyle/>
+          <a:p>
+            <a:r>
+              <a:rPr lang="en-US" dirty="0" smtClean="0"/>
+              <a:t>spacer icon is right above</a:t>
+            </a:r>
+            <a:endParaRPr lang="en-US" dirty="0"/>
+          </a:p>
+        </p:txBody>
+      </p:sp>
+      <p:sp>
+        <p:nvSpPr>
+          <p:cNvPr id="42" name="TextBox 41"/>
+          <p:cNvSpPr txBox="1"/>
+          <p:nvPr/>
+        </p:nvSpPr>
+        <p:spPr>
+          <a:xfrm>
+            <a:off x="8915400" y="3276600"/>
+            <a:ext cx="1143000" cy="1569660"/>
+          </a:xfrm>
+          <a:prstGeom prst="rect">
+            <a:avLst/>
+          </a:prstGeom>
+          <a:noFill/>
+        </p:spPr>
+        <p:txBody>
+          <a:bodyPr wrap="square" rtlCol="0">
+            <a:spAutoFit/>
+          </a:bodyPr>
+          <a:lstStyle/>
+          <a:p>
+            <a:r>
+              <a:rPr lang="en-US" sz="9600" b="1" dirty="0" smtClean="0">
+                <a:ea typeface="Arial" charset="0"/>
+                <a:cs typeface="Arial" charset="0"/>
+              </a:rPr>
+              <a:t>R</a:t>
+            </a:r>
+            <a:endParaRPr lang="en-US" sz="9600" b="1" dirty="0">
+              <a:ea typeface="Arial" charset="0"/>
+              <a:cs typeface="Arial" charset="0"/>
+            </a:endParaRPr>
           </a:p>
         </p:txBody>
       </p:sp>

</xml_diff>